<commit_message>
Finishing the powerpoint, don't spend too long on the history
</commit_message>
<xml_diff>
--- a/Project_Presentation_Joseph_Jabour.pptx
+++ b/Project_Presentation_Joseph_Jabour.pptx
@@ -5,7 +5,7 @@
     <p:sldMasterId id="2147483648" r:id="rId1"/>
   </p:sldMasterIdLst>
   <p:notesMasterIdLst>
-    <p:notesMasterId r:id="rId14"/>
+    <p:notesMasterId r:id="rId15"/>
   </p:notesMasterIdLst>
   <p:sldIdLst>
     <p:sldId id="256" r:id="rId2"/>
@@ -20,6 +20,7 @@
     <p:sldId id="265" r:id="rId11"/>
     <p:sldId id="266" r:id="rId12"/>
     <p:sldId id="267" r:id="rId13"/>
+    <p:sldId id="268" r:id="rId14"/>
   </p:sldIdLst>
   <p:sldSz cx="12192000" cy="6858000"/>
   <p:notesSz cx="6858000" cy="9144000"/>
@@ -563,7 +564,7 @@
           <a:p>
             <a:fld id="{405CED4A-5DCE-0543-A489-382C5AE0F58D}" type="slidenum">
               <a:rPr lang="en-US" smtClean="0"/>
-              <a:t>2</a:t>
+              <a:t>1</a:t>
             </a:fld>
             <a:endParaRPr lang="en-US"/>
           </a:p>
@@ -572,7 +573,117 @@
     </p:spTree>
     <p:extLst>
       <p:ext uri="{BB962C8B-B14F-4D97-AF65-F5344CB8AC3E}">
-        <p14:creationId xmlns:p14="http://schemas.microsoft.com/office/powerpoint/2010/main" val="482140270"/>
+        <p14:creationId xmlns:p14="http://schemas.microsoft.com/office/powerpoint/2010/main" val="1971412159"/>
+      </p:ext>
+    </p:extLst>
+  </p:cSld>
+  <p:clrMapOvr>
+    <a:masterClrMapping/>
+  </p:clrMapOvr>
+</p:notes>
+</file>
+
+<file path=ppt/notesSlides/notesSlide10.xml><?xml version="1.0" encoding="utf-8"?>
+<p:notes xmlns:a="http://schemas.openxmlformats.org/drawingml/2006/main" xmlns:r="http://schemas.openxmlformats.org/officeDocument/2006/relationships" xmlns:p="http://schemas.openxmlformats.org/presentationml/2006/main">
+  <p:cSld>
+    <p:spTree>
+      <p:nvGrpSpPr>
+        <p:cNvPr id="1" name=""/>
+        <p:cNvGrpSpPr/>
+        <p:nvPr/>
+      </p:nvGrpSpPr>
+      <p:grpSpPr>
+        <a:xfrm>
+          <a:off x="0" y="0"/>
+          <a:ext cx="0" cy="0"/>
+          <a:chOff x="0" y="0"/>
+          <a:chExt cx="0" cy="0"/>
+        </a:xfrm>
+      </p:grpSpPr>
+      <p:sp>
+        <p:nvSpPr>
+          <p:cNvPr id="2" name="Slide Image Placeholder 1"/>
+          <p:cNvSpPr>
+            <a:spLocks noGrp="1" noRot="1" noChangeAspect="1"/>
+          </p:cNvSpPr>
+          <p:nvPr>
+            <p:ph type="sldImg"/>
+          </p:nvPr>
+        </p:nvSpPr>
+        <p:spPr/>
+      </p:sp>
+      <p:sp>
+        <p:nvSpPr>
+          <p:cNvPr id="3" name="Notes Placeholder 2"/>
+          <p:cNvSpPr>
+            <a:spLocks noGrp="1"/>
+          </p:cNvSpPr>
+          <p:nvPr>
+            <p:ph type="body" idx="1"/>
+          </p:nvPr>
+        </p:nvSpPr>
+        <p:spPr/>
+        <p:txBody>
+          <a:bodyPr/>
+          <a:lstStyle/>
+          <a:p>
+            <a:r>
+              <a:rPr lang="en-US" dirty="0"/>
+              <a:t>While NLTK is a bit less user-friendly, the results showed a much higher rate of finding instances of the word ‘coat’ within our documentation</a:t>
+            </a:r>
+          </a:p>
+          <a:p>
+            <a:r>
+              <a:rPr lang="en-US" dirty="0"/>
+              <a:t>While this s helpful, there are many of other tools that can do that particular task.</a:t>
+            </a:r>
+          </a:p>
+          <a:p>
+            <a:r>
+              <a:rPr lang="en-US" dirty="0"/>
+              <a:t>We need to perform some more experimentation to find if this is is related to a way that </a:t>
+            </a:r>
+            <a:r>
+              <a:rPr lang="en-US" dirty="0" err="1"/>
+              <a:t>spaCy</a:t>
+            </a:r>
+            <a:r>
+              <a:rPr lang="en-US" dirty="0"/>
+              <a:t> does stemming or lemmatization, maybe it’s overcorrecting. Our data also needs to be double checked. Results from the supercomputer will be useful input as well. </a:t>
+            </a:r>
+          </a:p>
+          <a:p>
+            <a:endParaRPr lang="en-US" dirty="0"/>
+          </a:p>
+        </p:txBody>
+      </p:sp>
+      <p:sp>
+        <p:nvSpPr>
+          <p:cNvPr id="4" name="Slide Number Placeholder 3"/>
+          <p:cNvSpPr>
+            <a:spLocks noGrp="1"/>
+          </p:cNvSpPr>
+          <p:nvPr>
+            <p:ph type="sldNum" sz="quarter" idx="5"/>
+          </p:nvPr>
+        </p:nvSpPr>
+        <p:spPr/>
+        <p:txBody>
+          <a:bodyPr/>
+          <a:lstStyle/>
+          <a:p>
+            <a:fld id="{405CED4A-5DCE-0543-A489-382C5AE0F58D}" type="slidenum">
+              <a:rPr lang="en-US" smtClean="0"/>
+              <a:t>12</a:t>
+            </a:fld>
+            <a:endParaRPr lang="en-US"/>
+          </a:p>
+        </p:txBody>
+      </p:sp>
+    </p:spTree>
+    <p:extLst>
+      <p:ext uri="{BB962C8B-B14F-4D97-AF65-F5344CB8AC3E}">
+        <p14:creationId xmlns:p14="http://schemas.microsoft.com/office/powerpoint/2010/main" val="3836745918"/>
       </p:ext>
     </p:extLst>
   </p:cSld>
@@ -626,29 +737,6 @@
           <a:bodyPr/>
           <a:lstStyle/>
           <a:p>
-            <a:pPr marL="0" marR="0" lvl="0" indent="0" algn="l" defTabSz="914400" rtl="0" eaLnBrk="1" fontAlgn="auto" latinLnBrk="0" hangingPunct="1">
-              <a:lnSpc>
-                <a:spcPct val="100000"/>
-              </a:lnSpc>
-              <a:spcBef>
-                <a:spcPts val="0"/>
-              </a:spcBef>
-              <a:spcAft>
-                <a:spcPts val="0"/>
-              </a:spcAft>
-              <a:buClrTx/>
-              <a:buSzTx/>
-              <a:buFontTx/>
-              <a:buNone/>
-              <a:tabLst/>
-              <a:defRPr/>
-            </a:pPr>
-            <a:r>
-              <a:rPr lang="en-US" dirty="0"/>
-              <a:t>NLP - "a theoretically motivated range of computational techniques for analyzing and representing naturally occurring texts at one of more levels of linguistic analysis for the purpose of achieving human-like language processing for a range of tasks or further applications." (Elizabeth Liddy, 2001)</a:t>
-            </a:r>
-          </a:p>
-          <a:p>
             <a:endParaRPr lang="en-US" dirty="0"/>
           </a:p>
         </p:txBody>
@@ -670,7 +758,7 @@
           <a:p>
             <a:fld id="{405CED4A-5DCE-0543-A489-382C5AE0F58D}" type="slidenum">
               <a:rPr lang="en-US" smtClean="0"/>
-              <a:t>3</a:t>
+              <a:t>2</a:t>
             </a:fld>
             <a:endParaRPr lang="en-US"/>
           </a:p>
@@ -679,7 +767,7 @@
     </p:spTree>
     <p:extLst>
       <p:ext uri="{BB962C8B-B14F-4D97-AF65-F5344CB8AC3E}">
-        <p14:creationId xmlns:p14="http://schemas.microsoft.com/office/powerpoint/2010/main" val="4224019499"/>
+        <p14:creationId xmlns:p14="http://schemas.microsoft.com/office/powerpoint/2010/main" val="482140270"/>
       </p:ext>
     </p:extLst>
   </p:cSld>
@@ -733,48 +821,30 @@
           <a:bodyPr/>
           <a:lstStyle/>
           <a:p>
-            <a:r>
-              <a:rPr lang="en-US" dirty="0"/>
-              <a:t>1957 – Chomsky’s </a:t>
-            </a:r>
-            <a:r>
-              <a:rPr lang="en-US" dirty="0" err="1"/>
-              <a:t>bookChomsky</a:t>
-            </a:r>
-            <a:r>
-              <a:rPr lang="en-US" dirty="0"/>
-              <a:t> made a style of grammar called Phase-Structure Grammar that could methodically translate natural language to a format useful for computers</a:t>
-            </a:r>
-          </a:p>
-          <a:p>
-            <a:r>
-              <a:rPr lang="en-US" dirty="0"/>
-              <a:t>1966 – They had been funding research for 12 years and puts $20 million into it, but machine translations at the time were still so much more expensive than humans, and no computer available at the time came close to having enough power to do something like carry a conversation like a chatbot. AI and NLP were considered a dead technology</a:t>
-            </a:r>
-          </a:p>
-          <a:p>
-            <a:r>
-              <a:rPr lang="en-US" dirty="0"/>
-              <a:t>1980s – Instead of doing deep analytic work, the idea of NLP research was changed to create models that could do simple approximations instead. It became a work of statistics, and towards machine learning algorithms like decision trees, several of which developed by IBM</a:t>
-            </a:r>
-          </a:p>
-          <a:p>
-            <a:r>
-              <a:rPr lang="en-US" dirty="0"/>
-              <a:t>1990s – As the internet started to rise, statistical NLP models became valuable to keep pace with the influx of online text. N-Grams (means of clumping words together, like San Francisco as a place instead of two words). Recurrent NN – performs the same task for every element of a sequence, and the output is dependent on previous computations, aka using context to solve current computations</a:t>
-            </a:r>
-          </a:p>
-          <a:p>
-            <a:r>
-              <a:rPr lang="en-US" dirty="0"/>
-              <a:t>2001 – Feed Forward Neural Nets are similar to what we consider a neural network today. They receive an input, perform some calculations, and give an output</a:t>
-            </a:r>
-          </a:p>
-          <a:p>
-            <a:r>
-              <a:rPr lang="en-US" dirty="0"/>
-              <a:t>2011 – Siri was one of the first successful NLP/AI assistants that could use machine learning to make guesses about what the user wants even if their speech doesn’t match exactly what it knows to look for</a:t>
-            </a:r>
+            <a:pPr marL="0" marR="0" lvl="0" indent="0" algn="l" defTabSz="914400" rtl="0" eaLnBrk="1" fontAlgn="auto" latinLnBrk="0" hangingPunct="1">
+              <a:lnSpc>
+                <a:spcPct val="100000"/>
+              </a:lnSpc>
+              <a:spcBef>
+                <a:spcPts val="0"/>
+              </a:spcBef>
+              <a:spcAft>
+                <a:spcPts val="0"/>
+              </a:spcAft>
+              <a:buClrTx/>
+              <a:buSzTx/>
+              <a:buFontTx/>
+              <a:buNone/>
+              <a:tabLst/>
+              <a:defRPr/>
+            </a:pPr>
+            <a:r>
+              <a:rPr lang="en-US" dirty="0"/>
+              <a:t>NLP - "a theoretically motivated range of computational techniques for analyzing and representing naturally occurring texts at one of more levels of linguistic analysis for the purpose of achieving human-like language processing for a range of tasks or further applications." (Elizabeth Liddy, 2001)</a:t>
+            </a:r>
+          </a:p>
+          <a:p>
+            <a:endParaRPr lang="en-US" dirty="0"/>
           </a:p>
         </p:txBody>
       </p:sp>
@@ -795,7 +865,7 @@
           <a:p>
             <a:fld id="{405CED4A-5DCE-0543-A489-382C5AE0F58D}" type="slidenum">
               <a:rPr lang="en-US" smtClean="0"/>
-              <a:t>4</a:t>
+              <a:t>3</a:t>
             </a:fld>
             <a:endParaRPr lang="en-US"/>
           </a:p>
@@ -804,7 +874,7 @@
     </p:spTree>
     <p:extLst>
       <p:ext uri="{BB962C8B-B14F-4D97-AF65-F5344CB8AC3E}">
-        <p14:creationId xmlns:p14="http://schemas.microsoft.com/office/powerpoint/2010/main" val="3098353888"/>
+        <p14:creationId xmlns:p14="http://schemas.microsoft.com/office/powerpoint/2010/main" val="4224019499"/>
       </p:ext>
     </p:extLst>
   </p:cSld>
@@ -860,34 +930,45 @@
           <a:p>
             <a:r>
               <a:rPr lang="en-US" dirty="0"/>
-              <a:t>Disclaimer: I wrote my bullets before I asked </a:t>
+              <a:t>1957 – Chomsky’s </a:t>
             </a:r>
             <a:r>
               <a:rPr lang="en-US" dirty="0" err="1"/>
-              <a:t>ChatGPT</a:t>
-            </a:r>
-            <a:endParaRPr lang="en-US" dirty="0"/>
-          </a:p>
-          <a:p>
-            <a:r>
-              <a:rPr lang="en-US" dirty="0" err="1"/>
-              <a:t>Healthare</a:t>
-            </a:r>
-            <a:r>
-              <a:rPr lang="en-US" dirty="0"/>
-              <a:t> applications</a:t>
-            </a:r>
-          </a:p>
-          <a:p>
-            <a:r>
-              <a:rPr lang="en-US" dirty="0"/>
-              <a:t>Financial analysis</a:t>
-            </a:r>
-          </a:p>
-          <a:p>
-            <a:r>
-              <a:rPr lang="en-US" dirty="0"/>
-              <a:t>Information Retrieval</a:t>
+              <a:t>bookChomsky</a:t>
+            </a:r>
+            <a:r>
+              <a:rPr lang="en-US" dirty="0"/>
+              <a:t> made a style of grammar called Phase-Structure Grammar that could methodically translate natural language to a format useful for computers</a:t>
+            </a:r>
+          </a:p>
+          <a:p>
+            <a:r>
+              <a:rPr lang="en-US" dirty="0"/>
+              <a:t>1966 – They had been funding research for 12 years and puts $20 million into it, but machine translations at the time were still so much more expensive than humans, and no computer available at the time came close to having enough power to do something like carry a conversation like a chatbot. AI and NLP were considered a dead technology</a:t>
+            </a:r>
+          </a:p>
+          <a:p>
+            <a:r>
+              <a:rPr lang="en-US" dirty="0"/>
+              <a:t>1980s – Instead of doing deep analytic work, the idea of NLP research was changed to create models that could do simple approximations instead. It became a work of statistics, and towards machine learning algorithms like decision trees, several of which developed by IBM</a:t>
+            </a:r>
+          </a:p>
+          <a:p>
+            <a:r>
+              <a:rPr lang="en-US" dirty="0"/>
+              <a:t>1990s – As the internet started to rise, statistical NLP models became valuable to keep pace with the influx of online text. N-Grams (means of clumping words together, like San Francisco as a place instead of two words). Recurrent NN – performs the same task for every element of a sequence, and the output is dependent on previous computations, aka using context to solve current computations</a:t>
+            </a:r>
+          </a:p>
+          <a:p>
+            <a:r>
+              <a:rPr lang="en-US" dirty="0"/>
+              <a:t>2001 – Feed Forward Neural Nets are similar to what we consider a neural network today. They receive an input, perform some calculations, and give an output</a:t>
+            </a:r>
+          </a:p>
+          <a:p>
+            <a:r>
+              <a:rPr lang="en-US" dirty="0"/>
+              <a:t>2011 – Siri was one of the first successful NLP/AI assistants that could use machine learning to make guesses about what the user wants even if their speech doesn’t match exactly what it knows to look for</a:t>
             </a:r>
           </a:p>
         </p:txBody>
@@ -909,7 +990,7 @@
           <a:p>
             <a:fld id="{405CED4A-5DCE-0543-A489-382C5AE0F58D}" type="slidenum">
               <a:rPr lang="en-US" smtClean="0"/>
-              <a:t>5</a:t>
+              <a:t>4</a:t>
             </a:fld>
             <a:endParaRPr lang="en-US"/>
           </a:p>
@@ -918,7 +999,7 @@
     </p:spTree>
     <p:extLst>
       <p:ext uri="{BB962C8B-B14F-4D97-AF65-F5344CB8AC3E}">
-        <p14:creationId xmlns:p14="http://schemas.microsoft.com/office/powerpoint/2010/main" val="679121925"/>
+        <p14:creationId xmlns:p14="http://schemas.microsoft.com/office/powerpoint/2010/main" val="3098353888"/>
       </p:ext>
     </p:extLst>
   </p:cSld>
@@ -974,15 +1055,34 @@
           <a:p>
             <a:r>
               <a:rPr lang="en-US" dirty="0"/>
-              <a:t>There are more, including </a:t>
+              <a:t>Disclaimer: I wrote my bullets before I asked </a:t>
             </a:r>
             <a:r>
               <a:rPr lang="en-US" dirty="0" err="1"/>
-              <a:t>Gensim</a:t>
-            </a:r>
-            <a:r>
-              <a:rPr lang="en-US" dirty="0"/>
-              <a:t> for semantic modeling, and scikit-learn for machine learning.</a:t>
+              <a:t>ChatGPT</a:t>
+            </a:r>
+            <a:endParaRPr lang="en-US" dirty="0"/>
+          </a:p>
+          <a:p>
+            <a:r>
+              <a:rPr lang="en-US" dirty="0" err="1"/>
+              <a:t>Healthare</a:t>
+            </a:r>
+            <a:r>
+              <a:rPr lang="en-US" dirty="0"/>
+              <a:t> applications</a:t>
+            </a:r>
+          </a:p>
+          <a:p>
+            <a:r>
+              <a:rPr lang="en-US" dirty="0"/>
+              <a:t>Financial analysis</a:t>
+            </a:r>
+          </a:p>
+          <a:p>
+            <a:r>
+              <a:rPr lang="en-US" dirty="0"/>
+              <a:t>Information Retrieval</a:t>
             </a:r>
           </a:p>
         </p:txBody>
@@ -1004,7 +1104,7 @@
           <a:p>
             <a:fld id="{405CED4A-5DCE-0543-A489-382C5AE0F58D}" type="slidenum">
               <a:rPr lang="en-US" smtClean="0"/>
-              <a:t>7</a:t>
+              <a:t>5</a:t>
             </a:fld>
             <a:endParaRPr lang="en-US"/>
           </a:p>
@@ -1013,7 +1113,7 @@
     </p:spTree>
     <p:extLst>
       <p:ext uri="{BB962C8B-B14F-4D97-AF65-F5344CB8AC3E}">
-        <p14:creationId xmlns:p14="http://schemas.microsoft.com/office/powerpoint/2010/main" val="1477349698"/>
+        <p14:creationId xmlns:p14="http://schemas.microsoft.com/office/powerpoint/2010/main" val="679121925"/>
       </p:ext>
     </p:extLst>
   </p:cSld>
@@ -1069,49 +1169,15 @@
           <a:p>
             <a:r>
               <a:rPr lang="en-US" dirty="0"/>
-              <a:t>Loop through every journal article</a:t>
-            </a:r>
-          </a:p>
-          <a:p>
-            <a:r>
-              <a:rPr lang="en-US" dirty="0"/>
-              <a:t>Tokenize every individual word, separate words into their own string</a:t>
-            </a:r>
-          </a:p>
-          <a:p>
-            <a:r>
-              <a:rPr lang="en-US" dirty="0"/>
-              <a:t>Remove all the punctuation</a:t>
-            </a:r>
-          </a:p>
-          <a:p>
-            <a:r>
-              <a:rPr lang="en-US" dirty="0"/>
-              <a:t>Remove “stop words”, a, the, an, is, in, this</a:t>
-            </a:r>
-          </a:p>
-          <a:p>
-            <a:r>
-              <a:rPr lang="en-US" dirty="0"/>
-              <a:t>Determine part of speech - ?</a:t>
-            </a:r>
-          </a:p>
-          <a:p>
-            <a:r>
-              <a:rPr lang="en-US" dirty="0"/>
-              <a:t>Output the parts of speech to a file, will be useful for later development when working with tools like word2vec for sentiment analysis and word similarity</a:t>
-            </a:r>
-          </a:p>
-          <a:p>
-            <a:r>
-              <a:rPr lang="en-US" dirty="0"/>
-              <a:t>Originally, we wanted to just search every article for the word “coating”, I decided to stem the words and look for “coat” instead to get more results</a:t>
-            </a:r>
-          </a:p>
-          <a:p>
-            <a:r>
-              <a:rPr lang="en-US" dirty="0"/>
-              <a:t>Sort those results in descending order, output to file</a:t>
+              <a:t>There are more, including </a:t>
+            </a:r>
+            <a:r>
+              <a:rPr lang="en-US" dirty="0" err="1"/>
+              <a:t>Gensim</a:t>
+            </a:r>
+            <a:r>
+              <a:rPr lang="en-US" dirty="0"/>
+              <a:t> for semantic modeling, and scikit-learn for machine learning.</a:t>
             </a:r>
           </a:p>
         </p:txBody>
@@ -1133,7 +1199,7 @@
           <a:p>
             <a:fld id="{405CED4A-5DCE-0543-A489-382C5AE0F58D}" type="slidenum">
               <a:rPr lang="en-US" smtClean="0"/>
-              <a:t>8</a:t>
+              <a:t>7</a:t>
             </a:fld>
             <a:endParaRPr lang="en-US"/>
           </a:p>
@@ -1142,7 +1208,7 @@
     </p:spTree>
     <p:extLst>
       <p:ext uri="{BB962C8B-B14F-4D97-AF65-F5344CB8AC3E}">
-        <p14:creationId xmlns:p14="http://schemas.microsoft.com/office/powerpoint/2010/main" val="532864050"/>
+        <p14:creationId xmlns:p14="http://schemas.microsoft.com/office/powerpoint/2010/main" val="1477349698"/>
       </p:ext>
     </p:extLst>
   </p:cSld>
@@ -1198,34 +1264,49 @@
           <a:p>
             <a:r>
               <a:rPr lang="en-US" dirty="0"/>
-              <a:t>NLTK: 2567 seconds, ~42.8 minutes</a:t>
-            </a:r>
-          </a:p>
-          <a:p>
-            <a:r>
-              <a:rPr lang="en-US" dirty="0" err="1"/>
-              <a:t>spaCy</a:t>
-            </a:r>
-            <a:r>
-              <a:rPr lang="en-US" dirty="0"/>
-              <a:t>: 3055 seconds, ~50.9 minutes</a:t>
-            </a:r>
-            <a:br>
-              <a:rPr lang="en-US" dirty="0"/>
-            </a:br>
-            <a:br>
-              <a:rPr lang="en-US" dirty="0"/>
-            </a:br>
-            <a:r>
-              <a:rPr lang="en-US" dirty="0"/>
-              <a:t>Obviously other variables, biggest of which the computer I’m on. Relatively modern MacBook Pro. Currently using the supercomputer to run the same program on the entire set of documents, intend to have those results ready for the final paper.</a:t>
-            </a:r>
-            <a:br>
-              <a:rPr lang="en-US" dirty="0"/>
-            </a:br>
-            <a:r>
-              <a:rPr lang="en-US" dirty="0"/>
-              <a:t>I expect the results to be somewhat similar based on how many times I’ve run these programs, but who knows.</a:t>
+              <a:t>Loop through every journal article</a:t>
+            </a:r>
+          </a:p>
+          <a:p>
+            <a:r>
+              <a:rPr lang="en-US" dirty="0"/>
+              <a:t>Tokenize every individual word, separate words into their own string</a:t>
+            </a:r>
+          </a:p>
+          <a:p>
+            <a:r>
+              <a:rPr lang="en-US" dirty="0"/>
+              <a:t>Remove all the punctuation</a:t>
+            </a:r>
+          </a:p>
+          <a:p>
+            <a:r>
+              <a:rPr lang="en-US" dirty="0"/>
+              <a:t>Remove “stop words”, a, the, an, is, in, this</a:t>
+            </a:r>
+          </a:p>
+          <a:p>
+            <a:r>
+              <a:rPr lang="en-US" dirty="0"/>
+              <a:t>Determine part of speech - ?</a:t>
+            </a:r>
+          </a:p>
+          <a:p>
+            <a:r>
+              <a:rPr lang="en-US" dirty="0"/>
+              <a:t>Output the parts of speech to a file, will be useful for later development when working with tools like word2vec for sentiment analysis and word similarity</a:t>
+            </a:r>
+          </a:p>
+          <a:p>
+            <a:r>
+              <a:rPr lang="en-US" dirty="0"/>
+              <a:t>Originally, we wanted to just search every article for the word “coating”, I decided to stem the words and look for “coat” instead to get more results</a:t>
+            </a:r>
+          </a:p>
+          <a:p>
+            <a:r>
+              <a:rPr lang="en-US" dirty="0"/>
+              <a:t>Sort those results in descending order, output to file</a:t>
             </a:r>
           </a:p>
         </p:txBody>
@@ -1247,7 +1328,7 @@
           <a:p>
             <a:fld id="{405CED4A-5DCE-0543-A489-382C5AE0F58D}" type="slidenum">
               <a:rPr lang="en-US" smtClean="0"/>
-              <a:t>10</a:t>
+              <a:t>8</a:t>
             </a:fld>
             <a:endParaRPr lang="en-US"/>
           </a:p>
@@ -1256,7 +1337,7 @@
     </p:spTree>
     <p:extLst>
       <p:ext uri="{BB962C8B-B14F-4D97-AF65-F5344CB8AC3E}">
-        <p14:creationId xmlns:p14="http://schemas.microsoft.com/office/powerpoint/2010/main" val="319950377"/>
+        <p14:creationId xmlns:p14="http://schemas.microsoft.com/office/powerpoint/2010/main" val="532864050"/>
       </p:ext>
     </p:extLst>
   </p:cSld>
@@ -1312,23 +1393,34 @@
           <a:p>
             <a:r>
               <a:rPr lang="en-US" dirty="0"/>
-              <a:t>For some reason, </a:t>
-            </a:r>
+              <a:t>NLTK: 2567 seconds, ~42.8 minutes</a:t>
+            </a:r>
+          </a:p>
+          <a:p>
             <a:r>
               <a:rPr lang="en-US" dirty="0" err="1"/>
               <a:t>spaCy</a:t>
             </a:r>
             <a:r>
               <a:rPr lang="en-US" dirty="0"/>
-              <a:t> had results that differed greatly from NLTK. There is one particular file that NLTK seemed to have picked up over 100 instances of the word “coat” after stemming, while </a:t>
-            </a:r>
-            <a:r>
-              <a:rPr lang="en-US" dirty="0" err="1"/>
-              <a:t>spaCy</a:t>
-            </a:r>
-            <a:r>
-              <a:rPr lang="en-US" dirty="0"/>
-              <a:t> didn’t even detect 10 instances in the same file. At the same time, it detected 9 more instances of the word in a file than NLTK did.</a:t>
+              <a:t>: 3055 seconds, ~50.9 minutes</a:t>
+            </a:r>
+            <a:br>
+              <a:rPr lang="en-US" dirty="0"/>
+            </a:br>
+            <a:br>
+              <a:rPr lang="en-US" dirty="0"/>
+            </a:br>
+            <a:r>
+              <a:rPr lang="en-US" dirty="0"/>
+              <a:t>Obviously other variables, biggest of which the computer I’m on. Relatively modern MacBook Pro. Currently using the supercomputer to run the same program on the entire set of documents, intend to have those results ready for the final paper.</a:t>
+            </a:r>
+            <a:br>
+              <a:rPr lang="en-US" dirty="0"/>
+            </a:br>
+            <a:r>
+              <a:rPr lang="en-US" dirty="0"/>
+              <a:t>I expect the results to be somewhat similar based on how many times I’ve run these programs, but who knows.</a:t>
             </a:r>
           </a:p>
         </p:txBody>
@@ -1350,7 +1442,7 @@
           <a:p>
             <a:fld id="{405CED4A-5DCE-0543-A489-382C5AE0F58D}" type="slidenum">
               <a:rPr lang="en-US" smtClean="0"/>
-              <a:t>11</a:t>
+              <a:t>10</a:t>
             </a:fld>
             <a:endParaRPr lang="en-US"/>
           </a:p>
@@ -1359,7 +1451,7 @@
     </p:spTree>
     <p:extLst>
       <p:ext uri="{BB962C8B-B14F-4D97-AF65-F5344CB8AC3E}">
-        <p14:creationId xmlns:p14="http://schemas.microsoft.com/office/powerpoint/2010/main" val="1404461552"/>
+        <p14:creationId xmlns:p14="http://schemas.microsoft.com/office/powerpoint/2010/main" val="319950377"/>
       </p:ext>
     </p:extLst>
   </p:cSld>
@@ -1415,19 +1507,7 @@
           <a:p>
             <a:r>
               <a:rPr lang="en-US" dirty="0"/>
-              <a:t>While NLTK is a bit less user-friendly, the results showed a much higher rate of finding instances of the word ‘coat’ within our documentation</a:t>
-            </a:r>
-          </a:p>
-          <a:p>
-            <a:r>
-              <a:rPr lang="en-US" dirty="0"/>
-              <a:t>While this s helpful, there are many of other tools that can do that particular task.</a:t>
-            </a:r>
-          </a:p>
-          <a:p>
-            <a:r>
-              <a:rPr lang="en-US" dirty="0"/>
-              <a:t>We need to perform some more experimentation to find if this is is related to a way that </a:t>
+              <a:t>For some reason, </a:t>
             </a:r>
             <a:r>
               <a:rPr lang="en-US" dirty="0" err="1"/>
@@ -1435,11 +1515,16 @@
             </a:r>
             <a:r>
               <a:rPr lang="en-US" dirty="0"/>
-              <a:t> does stemming or lemmatization, maybe it’s overcorrecting. Our data also needs to be double checked. Results from the supercomputer will be useful input as well. </a:t>
-            </a:r>
-          </a:p>
-          <a:p>
-            <a:endParaRPr lang="en-US" dirty="0"/>
+              <a:t> had results that differed greatly from NLTK. There is one particular file that NLTK seemed to have picked up over 100 instances of the word “coat” after stemming, while </a:t>
+            </a:r>
+            <a:r>
+              <a:rPr lang="en-US" dirty="0" err="1"/>
+              <a:t>spaCy</a:t>
+            </a:r>
+            <a:r>
+              <a:rPr lang="en-US" dirty="0"/>
+              <a:t> didn’t even detect 10 instances in the same file. At the same time, it detected 9 more instances of the word in a file than NLTK did.</a:t>
+            </a:r>
           </a:p>
         </p:txBody>
       </p:sp>
@@ -1460,7 +1545,7 @@
           <a:p>
             <a:fld id="{405CED4A-5DCE-0543-A489-382C5AE0F58D}" type="slidenum">
               <a:rPr lang="en-US" smtClean="0"/>
-              <a:t>12</a:t>
+              <a:t>11</a:t>
             </a:fld>
             <a:endParaRPr lang="en-US"/>
           </a:p>
@@ -1469,7 +1554,7 @@
     </p:spTree>
     <p:extLst>
       <p:ext uri="{BB962C8B-B14F-4D97-AF65-F5344CB8AC3E}">
-        <p14:creationId xmlns:p14="http://schemas.microsoft.com/office/powerpoint/2010/main" val="3836745918"/>
+        <p14:creationId xmlns:p14="http://schemas.microsoft.com/office/powerpoint/2010/main" val="1404461552"/>
       </p:ext>
     </p:extLst>
   </p:cSld>
@@ -8500,13 +8585,8 @@
             <a:pPr lvl="1"/>
             <a:r>
               <a:rPr lang="en-US" dirty="0"/>
-              <a:t>Not horribly important, other tools can do </a:t>
-            </a:r>
-            <a:r>
-              <a:rPr lang="en-US"/>
-              <a:t>frequency calculation</a:t>
-            </a:r>
-            <a:endParaRPr lang="en-US" dirty="0"/>
+              <a:t>Not horribly important, other tools can do frequency calculation</a:t>
+            </a:r>
           </a:p>
         </p:txBody>
       </p:sp>
@@ -8514,6 +8594,252 @@
     <p:extLst>
       <p:ext uri="{BB962C8B-B14F-4D97-AF65-F5344CB8AC3E}">
         <p14:creationId xmlns:p14="http://schemas.microsoft.com/office/powerpoint/2010/main" val="3502363398"/>
+      </p:ext>
+    </p:extLst>
+  </p:cSld>
+  <p:clrMapOvr>
+    <a:masterClrMapping/>
+  </p:clrMapOvr>
+</p:sld>
+</file>
+
+<file path=ppt/slides/slide13.xml><?xml version="1.0" encoding="utf-8"?>
+<p:sld xmlns:a="http://schemas.openxmlformats.org/drawingml/2006/main" xmlns:r="http://schemas.openxmlformats.org/officeDocument/2006/relationships" xmlns:p="http://schemas.openxmlformats.org/presentationml/2006/main">
+  <p:cSld>
+    <p:spTree>
+      <p:nvGrpSpPr>
+        <p:cNvPr id="1" name=""/>
+        <p:cNvGrpSpPr/>
+        <p:nvPr/>
+      </p:nvGrpSpPr>
+      <p:grpSpPr>
+        <a:xfrm>
+          <a:off x="0" y="0"/>
+          <a:ext cx="0" cy="0"/>
+          <a:chOff x="0" y="0"/>
+          <a:chExt cx="0" cy="0"/>
+        </a:xfrm>
+      </p:grpSpPr>
+      <p:sp>
+        <p:nvSpPr>
+          <p:cNvPr id="2" name="Title 1">
+            <a:extLst>
+              <a:ext uri="{FF2B5EF4-FFF2-40B4-BE49-F238E27FC236}">
+                <a16:creationId xmlns:a16="http://schemas.microsoft.com/office/drawing/2014/main" id="{8C818215-BE9F-6584-0937-80C33F6ED66D}"/>
+              </a:ext>
+            </a:extLst>
+          </p:cNvPr>
+          <p:cNvSpPr>
+            <a:spLocks noGrp="1"/>
+          </p:cNvSpPr>
+          <p:nvPr>
+            <p:ph type="title"/>
+          </p:nvPr>
+        </p:nvSpPr>
+        <p:spPr>
+          <a:xfrm>
+            <a:off x="1141413" y="175591"/>
+            <a:ext cx="9905998" cy="653750"/>
+          </a:xfrm>
+        </p:spPr>
+        <p:txBody>
+          <a:bodyPr/>
+          <a:lstStyle/>
+          <a:p>
+            <a:r>
+              <a:rPr lang="en-US" dirty="0"/>
+              <a:t>References</a:t>
+            </a:r>
+          </a:p>
+        </p:txBody>
+      </p:sp>
+      <p:sp>
+        <p:nvSpPr>
+          <p:cNvPr id="3" name="Content Placeholder 2">
+            <a:extLst>
+              <a:ext uri="{FF2B5EF4-FFF2-40B4-BE49-F238E27FC236}">
+                <a16:creationId xmlns:a16="http://schemas.microsoft.com/office/drawing/2014/main" id="{FC154C96-6798-C165-B668-D609F8707488}"/>
+              </a:ext>
+            </a:extLst>
+          </p:cNvPr>
+          <p:cNvSpPr>
+            <a:spLocks noGrp="1"/>
+          </p:cNvSpPr>
+          <p:nvPr>
+            <p:ph idx="1"/>
+          </p:nvPr>
+        </p:nvSpPr>
+        <p:spPr>
+          <a:xfrm>
+            <a:off x="1141413" y="829341"/>
+            <a:ext cx="9905998" cy="5773478"/>
+          </a:xfrm>
+        </p:spPr>
+        <p:txBody>
+          <a:bodyPr>
+            <a:normAutofit fontScale="85000" lnSpcReduction="10000"/>
+          </a:bodyPr>
+          <a:lstStyle/>
+          <a:p>
+            <a:r>
+              <a:rPr lang="en-US" dirty="0">
+                <a:hlinkClick r:id="rId2"/>
+              </a:rPr>
+              <a:t>https://dev.to/thedevtimeline/compare-documents-similarity-using-python-nlp-4odp</a:t>
+            </a:r>
+            <a:endParaRPr lang="en-US" dirty="0"/>
+          </a:p>
+          <a:p>
+            <a:r>
+              <a:rPr lang="en-US" dirty="0">
+                <a:hlinkClick r:id="rId3"/>
+              </a:rPr>
+              <a:t>https://www.nltk.org/</a:t>
+            </a:r>
+            <a:endParaRPr lang="en-US" dirty="0"/>
+          </a:p>
+          <a:p>
+            <a:r>
+              <a:rPr lang="en-US" dirty="0">
+                <a:hlinkClick r:id="rId4"/>
+              </a:rPr>
+              <a:t>https://www.youtube.com/watch?v=X2vAabgKiuM</a:t>
+            </a:r>
+            <a:endParaRPr lang="en-US" dirty="0"/>
+          </a:p>
+          <a:p>
+            <a:r>
+              <a:rPr lang="en-US" dirty="0">
+                <a:hlinkClick r:id="rId5"/>
+              </a:rPr>
+              <a:t>https://courses.cs.duke.edu/spring14/compsci290/assignments/lab02.html</a:t>
+            </a:r>
+            <a:endParaRPr lang="en-US" dirty="0"/>
+          </a:p>
+          <a:p>
+            <a:r>
+              <a:rPr lang="en-US" dirty="0">
+                <a:hlinkClick r:id="rId6"/>
+              </a:rPr>
+              <a:t>https://www.geeksforgeeks.org/removing-stop-words-nltk-python/#</a:t>
+            </a:r>
+            <a:endParaRPr lang="en-US" dirty="0"/>
+          </a:p>
+          <a:p>
+            <a:r>
+              <a:rPr lang="en-US" dirty="0">
+                <a:hlinkClick r:id="rId7"/>
+              </a:rPr>
+              <a:t>https://blog.devgenius.io/time-complexity-with-examples-from-nlp-60c4feb9f31e</a:t>
+            </a:r>
+            <a:endParaRPr lang="en-US" dirty="0"/>
+          </a:p>
+          <a:p>
+            <a:r>
+              <a:rPr lang="en-US" dirty="0"/>
+              <a:t>Natural language processing with python /steven bird, Ewan </a:t>
+            </a:r>
+            <a:r>
+              <a:rPr lang="en-US" dirty="0" err="1"/>
+              <a:t>Klei</a:t>
+            </a:r>
+            <a:r>
+              <a:rPr lang="en-US" dirty="0"/>
+              <a:t> and Edward </a:t>
+            </a:r>
+            <a:r>
+              <a:rPr lang="en-US" dirty="0" err="1"/>
+              <a:t>Loper</a:t>
+            </a:r>
+            <a:endParaRPr lang="en-US" dirty="0"/>
+          </a:p>
+          <a:p>
+            <a:r>
+              <a:rPr lang="en-US" dirty="0">
+                <a:hlinkClick r:id="rId8"/>
+              </a:rPr>
+              <a:t>https://spacy.io/usage/spacy-101</a:t>
+            </a:r>
+            <a:endParaRPr lang="en-US" dirty="0"/>
+          </a:p>
+          <a:p>
+            <a:r>
+              <a:rPr lang="en-US" dirty="0">
+                <a:hlinkClick r:id="rId9"/>
+              </a:rPr>
+              <a:t>https://blog.ekbana.com/nlp-for-beninners-using-spacy-6161cf48a229</a:t>
+            </a:r>
+            <a:endParaRPr lang="en-US" dirty="0"/>
+          </a:p>
+          <a:p>
+            <a:r>
+              <a:rPr lang="en-US" dirty="0">
+                <a:hlinkClick r:id="rId10"/>
+              </a:rPr>
+              <a:t>https://www.digitalocean.com/community/tutorials/python-counter-python-collections-counter</a:t>
+            </a:r>
+            <a:endParaRPr lang="en-US" dirty="0"/>
+          </a:p>
+          <a:p>
+            <a:r>
+              <a:rPr lang="en-US" dirty="0">
+                <a:hlinkClick r:id="rId11"/>
+              </a:rPr>
+              <a:t>https://linearb.io/blog/what-is-code-complexity</a:t>
+            </a:r>
+            <a:endParaRPr lang="en-US" dirty="0"/>
+          </a:p>
+          <a:p>
+            <a:r>
+              <a:rPr lang="en-US" dirty="0">
+                <a:hlinkClick r:id="rId12"/>
+              </a:rPr>
+              <a:t>https://towardsdatascience.com/comparing-documents-with-similarity-metrics-e486bc678a7d</a:t>
+            </a:r>
+            <a:endParaRPr lang="en-US" dirty="0"/>
+          </a:p>
+          <a:p>
+            <a:r>
+              <a:rPr lang="en-US" dirty="0">
+                <a:hlinkClick r:id="rId13"/>
+              </a:rPr>
+              <a:t>https://hbr.org/2022/04/the-power-of-natural-language-processing</a:t>
+            </a:r>
+            <a:endParaRPr lang="en-US" dirty="0"/>
+          </a:p>
+          <a:p>
+            <a:r>
+              <a:rPr lang="en-US" dirty="0">
+                <a:hlinkClick r:id="rId14"/>
+              </a:rPr>
+              <a:t>https://www.aezion.com/blogs/natural-language-processing-what-it-is-and-why-its-important/</a:t>
+            </a:r>
+            <a:endParaRPr lang="en-US" dirty="0"/>
+          </a:p>
+          <a:p>
+            <a:r>
+              <a:rPr lang="en-US" dirty="0">
+                <a:hlinkClick r:id="rId15"/>
+              </a:rPr>
+              <a:t>https://www.dataversity.net/a-brief-history-of-natural-language-processing-nlp/</a:t>
+            </a:r>
+            <a:endParaRPr lang="en-US" dirty="0"/>
+          </a:p>
+          <a:p>
+            <a:endParaRPr lang="en-US" dirty="0"/>
+          </a:p>
+          <a:p>
+            <a:endParaRPr lang="en-US" dirty="0"/>
+          </a:p>
+          <a:p>
+            <a:endParaRPr lang="en-US" dirty="0"/>
+          </a:p>
+        </p:txBody>
+      </p:sp>
+    </p:spTree>
+    <p:extLst>
+      <p:ext uri="{BB962C8B-B14F-4D97-AF65-F5344CB8AC3E}">
+        <p14:creationId xmlns:p14="http://schemas.microsoft.com/office/powerpoint/2010/main" val="2571084019"/>
       </p:ext>
     </p:extLst>
   </p:cSld>

</xml_diff>

<commit_message>
added the excel and fixed the graph typo
</commit_message>
<xml_diff>
--- a/Project_Presentation_Joseph_Jabour.pptx
+++ b/Project_Presentation_Joseph_Jabour.pptx
@@ -7300,35 +7300,6 @@
           </a:p>
         </p:txBody>
       </p:sp>
-      <p:pic>
-        <p:nvPicPr>
-          <p:cNvPr id="5" name="Content Placeholder 4" descr="Chart, line chart&#10;&#10;Description automatically generated">
-            <a:extLst>
-              <a:ext uri="{FF2B5EF4-FFF2-40B4-BE49-F238E27FC236}">
-                <a16:creationId xmlns:a16="http://schemas.microsoft.com/office/drawing/2014/main" id="{84C15AA8-8345-38EE-9483-0E8D02286763}"/>
-              </a:ext>
-            </a:extLst>
-          </p:cNvPr>
-          <p:cNvPicPr>
-            <a:picLocks noGrp="1" noChangeAspect="1"/>
-          </p:cNvPicPr>
-          <p:nvPr>
-            <p:ph idx="1"/>
-          </p:nvPr>
-        </p:nvPicPr>
-        <p:blipFill>
-          <a:blip r:embed="rId3"/>
-          <a:stretch>
-            <a:fillRect/>
-          </a:stretch>
-        </p:blipFill>
-        <p:spPr>
-          <a:xfrm>
-            <a:off x="1141413" y="869513"/>
-            <a:ext cx="9905998" cy="5118973"/>
-          </a:xfrm>
-        </p:spPr>
-      </p:pic>
       <p:sp>
         <p:nvSpPr>
           <p:cNvPr id="6" name="TextBox 5">
@@ -7438,6 +7409,36 @@
           </a:p>
         </p:txBody>
       </p:sp>
+      <p:pic>
+        <p:nvPicPr>
+          <p:cNvPr id="12" name="Picture 11">
+            <a:extLst>
+              <a:ext uri="{FF2B5EF4-FFF2-40B4-BE49-F238E27FC236}">
+                <a16:creationId xmlns:a16="http://schemas.microsoft.com/office/drawing/2014/main" id="{97DB8218-2448-E008-5FDE-5868E05A9931}"/>
+              </a:ext>
+            </a:extLst>
+          </p:cNvPr>
+          <p:cNvPicPr>
+            <a:picLocks noChangeAspect="1"/>
+          </p:cNvPicPr>
+          <p:nvPr/>
+        </p:nvPicPr>
+        <p:blipFill>
+          <a:blip r:embed="rId3"/>
+          <a:stretch>
+            <a:fillRect/>
+          </a:stretch>
+        </p:blipFill>
+        <p:spPr>
+          <a:xfrm>
+            <a:off x="1141412" y="891136"/>
+            <a:ext cx="9905998" cy="5075728"/>
+          </a:xfrm>
+          <a:prstGeom prst="rect">
+            <a:avLst/>
+          </a:prstGeom>
+        </p:spPr>
+      </p:pic>
     </p:spTree>
     <p:extLst>
       <p:ext uri="{BB962C8B-B14F-4D97-AF65-F5344CB8AC3E}">
@@ -8677,7 +8678,7 @@
         </p:spPr>
         <p:txBody>
           <a:bodyPr>
-            <a:normAutofit fontScale="85000" lnSpcReduction="10000"/>
+            <a:normAutofit fontScale="85000" lnSpcReduction="20000"/>
           </a:bodyPr>
           <a:lstStyle/>
           <a:p>
@@ -8823,6 +8824,18 @@
               </a:rPr>
               <a:t>https://www.dataversity.net/a-brief-history-of-natural-language-processing-nlp/</a:t>
             </a:r>
+            <a:endParaRPr lang="en-US" dirty="0"/>
+          </a:p>
+          <a:p>
+            <a:r>
+              <a:rPr lang="en-US" dirty="0">
+                <a:hlinkClick r:id="rId16"/>
+              </a:rPr>
+              <a:t>https://medium.com/analytics-vidhya/nlp-libraries-and-pretrained-models-94c9a53a295a</a:t>
+            </a:r>
+            <a:endParaRPr lang="en-US" dirty="0"/>
+          </a:p>
+          <a:p>
             <a:endParaRPr lang="en-US" dirty="0"/>
           </a:p>
           <a:p>

</xml_diff>

<commit_message>
Typos in the powerpoint, downloaded the paper
</commit_message>
<xml_diff>
--- a/Project_Presentation_Joseph_Jabour.pptx
+++ b/Project_Presentation_Joseph_Jabour.pptx
@@ -844,6 +844,29 @@
             </a:r>
           </a:p>
           <a:p>
+            <a:pPr marL="0" marR="0" lvl="0" indent="0" algn="l" defTabSz="914400" rtl="0" eaLnBrk="1" fontAlgn="auto" latinLnBrk="0" hangingPunct="1">
+              <a:lnSpc>
+                <a:spcPct val="100000"/>
+              </a:lnSpc>
+              <a:spcBef>
+                <a:spcPts val="0"/>
+              </a:spcBef>
+              <a:spcAft>
+                <a:spcPts val="0"/>
+              </a:spcAft>
+              <a:buClrTx/>
+              <a:buSzTx/>
+              <a:buFontTx/>
+              <a:buNone/>
+              <a:tabLst/>
+              <a:defRPr/>
+            </a:pPr>
+            <a:r>
+              <a:rPr lang="en-US" dirty="0"/>
+              <a:t>Dependency parsing – finding grammatical relationships b/w words in a sentence</a:t>
+            </a:r>
+          </a:p>
+          <a:p>
             <a:endParaRPr lang="en-US" dirty="0"/>
           </a:p>
         </p:txBody>
@@ -930,15 +953,7 @@
           <a:p>
             <a:r>
               <a:rPr lang="en-US" dirty="0"/>
-              <a:t>1957 – Chomsky’s </a:t>
-            </a:r>
-            <a:r>
-              <a:rPr lang="en-US" dirty="0" err="1"/>
-              <a:t>bookChomsky</a:t>
-            </a:r>
-            <a:r>
-              <a:rPr lang="en-US" dirty="0"/>
-              <a:t> made a style of grammar called Phase-Structure Grammar that could methodically translate natural language to a format useful for computers</a:t>
+              <a:t>1957 – Chomsky’s book made a style of grammar called Phase-Structure Grammar that could methodically translate natural language to a format useful for computers</a:t>
             </a:r>
           </a:p>
           <a:p>
@@ -7295,7 +7310,7 @@
           <a:p>
             <a:r>
               <a:rPr lang="en-US" dirty="0"/>
-              <a:t>Results</a:t>
+              <a:t>Results - time</a:t>
             </a:r>
           </a:p>
         </p:txBody>
@@ -8059,8 +8074,13 @@
           <a:p>
             <a:r>
               <a:rPr lang="en-US" dirty="0"/>
-              <a:t>Results – search of “coat”</a:t>
-            </a:r>
+              <a:t>Results </a:t>
+            </a:r>
+            <a:r>
+              <a:rPr lang="en-US"/>
+              <a:t>– overall</a:t>
+            </a:r>
+            <a:endParaRPr lang="en-US" dirty="0"/>
           </a:p>
         </p:txBody>
       </p:sp>
@@ -9352,7 +9372,7 @@
           <a:p>
             <a:r>
               <a:rPr lang="en-US" dirty="0"/>
-              <a:t>1990s – N-Grams have a rise in popularity. In 1997, Recurrent Neural Net models are introduced. In mid-2000s, they’re used for voice and text processing</a:t>
+              <a:t>1990s –Recurrent Neural Net models are introduced. In mid-2000s, they’re used for voice and text processing</a:t>
             </a:r>
           </a:p>
           <a:p>
@@ -9638,7 +9658,7 @@
           <a:p>
             <a:r>
               <a:rPr lang="en-US" dirty="0"/>
-              <a:t>Goal</a:t>
+              <a:t>Project Goal</a:t>
             </a:r>
           </a:p>
         </p:txBody>

</xml_diff>